<commit_message>
Current slides; removal of deprecated config
</commit_message>
<xml_diff>
--- a/Slides/TechComm_Bicep_Presentation.pptx
+++ b/Slides/TechComm_Bicep_Presentation.pptx
@@ -7641,7 +7641,7 @@
           <a:p>
             <a:pPr algn="l"/>
             <a:r>
-              <a:rPr lang="en-US" sz="5000"/>
+              <a:rPr lang="en-US" sz="5000" dirty="0"/>
               <a:t>Infrastructure as Code</a:t>
             </a:r>
           </a:p>
@@ -7666,7 +7666,7 @@
         <p:spPr>
           <a:xfrm>
             <a:off x="890339" y="4636008"/>
-            <a:ext cx="3734014" cy="1572768"/>
+            <a:ext cx="3353670" cy="1572768"/>
           </a:xfrm>
         </p:spPr>
         <p:txBody>

</xml_diff>